<commit_message>
Added Image Tagging Best Practices link to blog post
</commit_message>
<xml_diff>
--- a/ACR/ImageTaggingBestPractices.pptx
+++ b/ACR/ImageTaggingBestPractices.pptx
@@ -112,6 +112,11 @@
       </a:defRPr>
     </a:lvl9pPr>
   </p:defaultTextStyle>
+  <p:extLst>
+    <p:ext uri="{EFAFB233-063F-42B5-8137-9DF3F51BA10A}">
+      <p15:sldGuideLst xmlns:p15="http://schemas.microsoft.com/office/powerpoint/2012/main"/>
+    </p:ext>
+  </p:extLst>
 </p:presentation>
 </file>
 
@@ -851,7 +856,7 @@
                 <a:tabLst/>
                 <a:defRPr/>
               </a:pPr>
-              <a:t>2/28/2018 7:12 PM</a:t>
+              <a:t>2/28/2018 7:49 PM</a:t>
             </a:fld>
             <a:endParaRPr kumimoji="0" lang="en-US" sz="1200" b="0" i="0" u="none" strike="noStrike" kern="1200" cap="none" spc="0" normalizeH="0" baseline="0" noProof="0" dirty="0">
               <a:ln>
@@ -1209,7 +1214,7 @@
                 <a:tabLst/>
                 <a:defRPr/>
               </a:pPr>
-              <a:t>2/28/2018 7:12 PM</a:t>
+              <a:t>2/28/2018 7:49 PM</a:t>
             </a:fld>
             <a:endParaRPr kumimoji="0" lang="en-US" sz="1200" b="0" i="0" u="none" strike="noStrike" kern="1200" cap="none" spc="0" normalizeH="0" baseline="0" noProof="0" dirty="0">
               <a:ln>
@@ -1567,7 +1572,7 @@
                 <a:tabLst/>
                 <a:defRPr/>
               </a:pPr>
-              <a:t>2/28/2018 7:12 PM</a:t>
+              <a:t>2/28/2018 7:49 PM</a:t>
             </a:fld>
             <a:endParaRPr kumimoji="0" lang="en-US" sz="1200" b="0" i="0" u="none" strike="noStrike" kern="1200" cap="none" spc="0" normalizeH="0" baseline="0" noProof="0" dirty="0">
               <a:ln>
@@ -1864,7 +1869,7 @@
           <a:p>
             <a:fld id="{38EEC551-8CDA-4EB6-89BB-2A86C9F091C8}" type="datetime8">
               <a:rPr lang="en-US" smtClean="0"/>
-              <a:t>2/28/2018 7:13 PM</a:t>
+              <a:t>2/28/2018 7:49 PM</a:t>
             </a:fld>
             <a:endParaRPr lang="en-US" dirty="0"/>
           </a:p>
@@ -2224,7 +2229,7 @@
           <a:p>
             <a:fld id="{D18B56EA-E28F-4F92-9F16-7A6F2501B303}" type="datetime8">
               <a:rPr lang="en-US" smtClean="0"/>
-              <a:t>2/28/2018 7:13 PM</a:t>
+              <a:t>2/28/2018 7:49 PM</a:t>
             </a:fld>
             <a:endParaRPr lang="en-US" dirty="0"/>
           </a:p>
@@ -5575,11 +5580,7 @@
           <a:p>
             <a:r>
               <a:rPr lang="en-US" dirty="0"/>
-              <a:t>Best Practices </a:t>
-            </a:r>
-            <a:r>
-              <a:rPr lang="en-US"/>
-              <a:t>for Image Tagging</a:t>
+              <a:t>Best Practices for Image Tagging</a:t>
             </a:r>
             <a:br>
               <a:rPr lang="en-US" dirty="0"/>
@@ -5697,6 +5698,43 @@
               <a:t>/Presentations</a:t>
             </a:r>
             <a:endParaRPr lang="en-US" sz="2000" dirty="0"/>
+          </a:p>
+        </p:txBody>
+      </p:sp>
+      <p:sp>
+        <p:nvSpPr>
+          <p:cNvPr id="3" name="Rectangle 2">
+            <a:extLst>
+              <a:ext uri="{FF2B5EF4-FFF2-40B4-BE49-F238E27FC236}">
+                <a16:creationId xmlns:a16="http://schemas.microsoft.com/office/drawing/2014/main" id="{C0F42980-3338-4A0B-85AB-5CB2BE09592C}"/>
+              </a:ext>
+            </a:extLst>
+          </p:cNvPr>
+          <p:cNvSpPr/>
+          <p:nvPr/>
+        </p:nvSpPr>
+        <p:spPr>
+          <a:xfrm>
+            <a:off x="6041721" y="6137133"/>
+            <a:ext cx="6096000" cy="646331"/>
+          </a:xfrm>
+          <a:prstGeom prst="rect">
+            <a:avLst/>
+          </a:prstGeom>
+        </p:spPr>
+        <p:txBody>
+          <a:bodyPr>
+            <a:spAutoFit/>
+          </a:bodyPr>
+          <a:lstStyle/>
+          <a:p>
+            <a:r>
+              <a:rPr lang="en-US" dirty="0">
+                <a:hlinkClick r:id="rId5"/>
+              </a:rPr>
+              <a:t>https://blogs.msdn.microsoft.com/stevelasker/2018/03/01/best-practices-for-tagging-and-versioning-docker-images/</a:t>
+            </a:r>
+            <a:endParaRPr lang="en-US" dirty="0"/>
           </a:p>
         </p:txBody>
       </p:sp>

</xml_diff>